<commit_message>
Update Aplikasi Catalog Board Game.pptx
</commit_message>
<xml_diff>
--- a/Aplikasi Catalog Board Game.pptx
+++ b/Aplikasi Catalog Board Game.pptx
@@ -4365,13 +4365,38 @@
           </a:bodyPr>
           <a:lstStyle/>
           <a:p>
-            <a:r>
-              <a:rPr lang="en-US" dirty="0" err="1"/>
-              <a:t>Aplikasi</a:t>
-            </a:r>
+            <a:pPr algn="ctr"/>
             <a:r>
               <a:rPr lang="en-US" dirty="0"/>
-              <a:t> Catalog Board Game</a:t>
+              <a:t>A</a:t>
+            </a:r>
+            <a:r>
+              <a:rPr lang="id-ID" dirty="0"/>
+              <a:t>PLIKASI </a:t>
+            </a:r>
+            <a:r>
+              <a:rPr lang="en-US" dirty="0"/>
+              <a:t>C</a:t>
+            </a:r>
+            <a:r>
+              <a:rPr lang="id-ID" dirty="0"/>
+              <a:t>ATALOG</a:t>
+            </a:r>
+            <a:r>
+              <a:rPr lang="en-US" dirty="0"/>
+              <a:t> B</a:t>
+            </a:r>
+            <a:r>
+              <a:rPr lang="id-ID" dirty="0"/>
+              <a:t>OARD</a:t>
+            </a:r>
+            <a:r>
+              <a:rPr lang="en-US" dirty="0"/>
+              <a:t> G</a:t>
+            </a:r>
+            <a:r>
+              <a:rPr lang="id-ID" dirty="0"/>
+              <a:t>AME</a:t>
             </a:r>
             <a:endParaRPr lang="en-ID" dirty="0"/>
           </a:p>
@@ -4609,7 +4634,7 @@
           <a:p>
             <a:r>
               <a:rPr lang="id-ID" dirty="0"/>
-              <a:t>Wireframe Admin</a:t>
+              <a:t>WIREFRAME : Admin</a:t>
             </a:r>
             <a:endParaRPr lang="en-ID" dirty="0"/>
           </a:p>
@@ -4700,7 +4725,7 @@
         <p:spPr>
           <a:xfrm>
             <a:off x="438538" y="0"/>
-            <a:ext cx="10077061" cy="909493"/>
+            <a:ext cx="10077061" cy="789709"/>
           </a:xfrm>
         </p:spPr>
         <p:txBody>
@@ -4709,7 +4734,7 @@
           <a:p>
             <a:r>
               <a:rPr lang="id-ID" dirty="0"/>
-              <a:t>Wireframe Client</a:t>
+              <a:t>WIREFRAME : Client</a:t>
             </a:r>
             <a:endParaRPr lang="en-ID" dirty="0"/>
           </a:p>
@@ -4743,8 +4768,8 @@
         </p:blipFill>
         <p:spPr>
           <a:xfrm>
-            <a:off x="0" y="909493"/>
-            <a:ext cx="12191999" cy="5948507"/>
+            <a:off x="0" y="789709"/>
+            <a:ext cx="12191999" cy="6068291"/>
           </a:xfrm>
           <a:prstGeom prst="rect">
             <a:avLst/>
@@ -4799,8 +4824,8 @@
         </p:nvSpPr>
         <p:spPr>
           <a:xfrm>
-            <a:off x="727788" y="286604"/>
-            <a:ext cx="10427892" cy="861062"/>
+            <a:off x="1059991" y="940028"/>
+            <a:ext cx="10566743" cy="861062"/>
           </a:xfrm>
         </p:spPr>
         <p:txBody>
@@ -4809,9 +4834,12 @@
           <a:p>
             <a:r>
               <a:rPr lang="en-US" dirty="0"/>
-              <a:t>Mockup</a:t>
-            </a:r>
-            <a:endParaRPr lang="id-ID" dirty="0"/>
+              <a:t>M</a:t>
+            </a:r>
+            <a:r>
+              <a:rPr lang="id-ID" dirty="0"/>
+              <a:t>OCKUP</a:t>
+            </a:r>
           </a:p>
         </p:txBody>
       </p:sp>
@@ -4845,8 +4873,8 @@
         </p:blipFill>
         <p:spPr>
           <a:xfrm>
-            <a:off x="838200" y="1690688"/>
-            <a:ext cx="2009546" cy="4351338"/>
+            <a:off x="1059991" y="1801090"/>
+            <a:ext cx="2009546" cy="4502728"/>
           </a:xfrm>
         </p:spPr>
       </p:pic>
@@ -4878,8 +4906,8 @@
         </p:blipFill>
         <p:spPr>
           <a:xfrm>
-            <a:off x="2914429" y="1690688"/>
-            <a:ext cx="2009546" cy="4351338"/>
+            <a:off x="3102532" y="1801090"/>
+            <a:ext cx="2009546" cy="4502728"/>
           </a:xfrm>
           <a:prstGeom prst="rect">
             <a:avLst/>
@@ -4914,8 +4942,8 @@
         </p:blipFill>
         <p:spPr>
           <a:xfrm>
-            <a:off x="4990658" y="1690688"/>
-            <a:ext cx="2009547" cy="4351338"/>
+            <a:off x="5145073" y="1801090"/>
+            <a:ext cx="2009547" cy="4502728"/>
           </a:xfrm>
           <a:prstGeom prst="rect">
             <a:avLst/>
@@ -4950,8 +4978,8 @@
         </p:blipFill>
         <p:spPr>
           <a:xfrm>
-            <a:off x="7140200" y="1690688"/>
-            <a:ext cx="2009546" cy="4351338"/>
+            <a:off x="7171118" y="1801090"/>
+            <a:ext cx="2009546" cy="4502728"/>
           </a:xfrm>
           <a:prstGeom prst="rect">
             <a:avLst/>
@@ -4986,8 +5014,8 @@
         </p:blipFill>
         <p:spPr>
           <a:xfrm>
-            <a:off x="9277571" y="1690688"/>
-            <a:ext cx="2009547" cy="4351338"/>
+            <a:off x="9213659" y="1801090"/>
+            <a:ext cx="2009547" cy="4502728"/>
           </a:xfrm>
           <a:prstGeom prst="rect">
             <a:avLst/>
@@ -5024,31 +5052,6 @@
           <a:chExt cx="0" cy="0"/>
         </a:xfrm>
       </p:grpSpPr>
-      <p:sp>
-        <p:nvSpPr>
-          <p:cNvPr id="2" name="Title 1">
-            <a:extLst>
-              <a:ext uri="{FF2B5EF4-FFF2-40B4-BE49-F238E27FC236}">
-                <a16:creationId xmlns:a16="http://schemas.microsoft.com/office/drawing/2014/main" id="{CD1559FC-B825-4B23-AC04-201E22B52DD0}"/>
-              </a:ext>
-            </a:extLst>
-          </p:cNvPr>
-          <p:cNvSpPr>
-            <a:spLocks noGrp="1"/>
-          </p:cNvSpPr>
-          <p:nvPr>
-            <p:ph type="title"/>
-          </p:nvPr>
-        </p:nvSpPr>
-        <p:spPr/>
-        <p:txBody>
-          <a:bodyPr/>
-          <a:lstStyle/>
-          <a:p>
-            <a:endParaRPr lang="id-ID"/>
-          </a:p>
-        </p:txBody>
-      </p:sp>
       <p:pic>
         <p:nvPicPr>
           <p:cNvPr id="5" name="Content Placeholder 4">
@@ -5079,8 +5082,8 @@
         </p:blipFill>
         <p:spPr>
           <a:xfrm>
-            <a:off x="1229441" y="1690688"/>
-            <a:ext cx="2009546" cy="4351338"/>
+            <a:off x="1868635" y="1862050"/>
+            <a:ext cx="2009546" cy="4483329"/>
           </a:xfrm>
         </p:spPr>
       </p:pic>
@@ -5112,8 +5115,8 @@
         </p:blipFill>
         <p:spPr>
           <a:xfrm>
-            <a:off x="8313819" y="1690688"/>
-            <a:ext cx="2009547" cy="4351338"/>
+            <a:off x="8209683" y="1862050"/>
+            <a:ext cx="2009547" cy="4483331"/>
           </a:xfrm>
           <a:prstGeom prst="rect">
             <a:avLst/>
@@ -5148,8 +5151,8 @@
         </p:blipFill>
         <p:spPr>
           <a:xfrm>
-            <a:off x="3620897" y="1690688"/>
-            <a:ext cx="2009547" cy="4351338"/>
+            <a:off x="3982317" y="1862050"/>
+            <a:ext cx="2009547" cy="4483330"/>
           </a:xfrm>
           <a:prstGeom prst="rect">
             <a:avLst/>
@@ -5184,8 +5187,8 @@
         </p:blipFill>
         <p:spPr>
           <a:xfrm>
-            <a:off x="6096000" y="1690688"/>
-            <a:ext cx="2009547" cy="4351338"/>
+            <a:off x="6096000" y="1862050"/>
+            <a:ext cx="2009547" cy="4483330"/>
           </a:xfrm>
           <a:prstGeom prst="rect">
             <a:avLst/>
@@ -5238,14 +5241,19 @@
             <p:ph type="title"/>
           </p:nvPr>
         </p:nvSpPr>
-        <p:spPr/>
+        <p:spPr>
+          <a:xfrm>
+            <a:off x="1097280" y="286603"/>
+            <a:ext cx="10058400" cy="1472924"/>
+          </a:xfrm>
+        </p:spPr>
         <p:txBody>
           <a:bodyPr/>
           <a:lstStyle/>
           <a:p>
             <a:r>
               <a:rPr lang="id-ID" dirty="0"/>
-              <a:t>Terima Kasih</a:t>
+              <a:t>TERIMA KASIH</a:t>
             </a:r>
             <a:endParaRPr lang="en-ID" dirty="0"/>
           </a:p>
@@ -5299,8 +5307,8 @@
         </p:nvSpPr>
         <p:spPr>
           <a:xfrm>
-            <a:off x="1097280" y="121299"/>
-            <a:ext cx="10058400" cy="1129003"/>
+            <a:off x="1080653" y="966426"/>
+            <a:ext cx="10058400" cy="765393"/>
           </a:xfrm>
         </p:spPr>
         <p:txBody>
@@ -5335,8 +5343,8 @@
         </p:nvSpPr>
         <p:spPr>
           <a:xfrm>
-            <a:off x="838200" y="1250302"/>
-            <a:ext cx="10515600" cy="5122789"/>
+            <a:off x="761999" y="1731819"/>
+            <a:ext cx="10695709" cy="4641272"/>
           </a:xfrm>
         </p:spPr>
         <p:txBody>
@@ -6740,7 +6748,7 @@
               </a:rPr>
               <a:t>Sobari</a:t>
             </a:r>
-            <a:endParaRPr lang="en-US" sz="1900" dirty="0">
+            <a:endParaRPr lang="id-ID" sz="1900" dirty="0">
               <a:effectLst/>
               <a:latin typeface="Calibri (Body)"/>
               <a:ea typeface="DengXian" panose="02010600030101010101" pitchFamily="2" charset="-122"/>
@@ -6752,30 +6760,30 @@
               <a:buNone/>
             </a:pPr>
             <a:r>
+              <a:rPr lang="id-ID" sz="1900" dirty="0">
+                <a:latin typeface="Calibri (Body)"/>
+                <a:ea typeface="DengXian" panose="02010600030101010101" pitchFamily="2" charset="-122"/>
+                <a:cs typeface="Times New Roman" panose="02020603050405020304" pitchFamily="18" charset="0"/>
+              </a:rPr>
+              <a:t>					  </a:t>
+            </a:r>
+            <a:r>
+              <a:rPr lang="en-US" sz="1900" dirty="0" err="1">
+                <a:effectLst/>
+                <a:latin typeface="Calibri (Body)"/>
+                <a:ea typeface="DengXian" panose="02010600030101010101" pitchFamily="2" charset="-122"/>
+                <a:cs typeface="Times New Roman" panose="02020603050405020304" pitchFamily="18" charset="0"/>
+              </a:rPr>
+              <a:t>Angga</a:t>
+            </a:r>
+            <a:r>
               <a:rPr lang="en-US" sz="1900" dirty="0">
                 <a:effectLst/>
                 <a:latin typeface="Calibri (Body)"/>
                 <a:ea typeface="DengXian" panose="02010600030101010101" pitchFamily="2" charset="-122"/>
                 <a:cs typeface="Times New Roman" panose="02020603050405020304" pitchFamily="18" charset="0"/>
               </a:rPr>
-              <a:t>				</a:t>
-            </a:r>
-            <a:r>
-              <a:rPr lang="en-US" sz="1900" dirty="0">
-                <a:latin typeface="Calibri (Body)"/>
-                <a:ea typeface="DengXian" panose="02010600030101010101" pitchFamily="2" charset="-122"/>
-                <a:cs typeface="Times New Roman" panose="02020603050405020304" pitchFamily="18" charset="0"/>
-              </a:rPr>
-              <a:t> 	  </a:t>
-            </a:r>
-            <a:r>
-              <a:rPr lang="en-US" sz="1900" dirty="0">
-                <a:effectLst/>
-                <a:latin typeface="Calibri (Body)"/>
-                <a:ea typeface="DengXian" panose="02010600030101010101" pitchFamily="2" charset="-122"/>
-                <a:cs typeface="Times New Roman" panose="02020603050405020304" pitchFamily="18" charset="0"/>
-              </a:rPr>
-              <a:t>Angga Raga Pala</a:t>
+              <a:t> Raga Pala</a:t>
             </a:r>
             <a:endParaRPr lang="id-ID" sz="1900" dirty="0">
               <a:effectLst/>
@@ -6832,16 +6840,24 @@
             <p:ph type="title"/>
           </p:nvPr>
         </p:nvSpPr>
-        <p:spPr/>
+        <p:spPr>
+          <a:xfrm>
+            <a:off x="1191490" y="942108"/>
+            <a:ext cx="9964189" cy="775855"/>
+          </a:xfrm>
+        </p:spPr>
         <p:txBody>
           <a:bodyPr/>
           <a:lstStyle/>
           <a:p>
             <a:r>
               <a:rPr lang="en-US" dirty="0"/>
-              <a:t>Logo</a:t>
-            </a:r>
-            <a:endParaRPr lang="id-ID" dirty="0"/>
+              <a:t>L</a:t>
+            </a:r>
+            <a:r>
+              <a:rPr lang="id-ID" dirty="0"/>
+              <a:t>OGO</a:t>
+            </a:r>
           </a:p>
         </p:txBody>
       </p:sp>
@@ -6928,8 +6944,8 @@
         </p:nvSpPr>
         <p:spPr>
           <a:xfrm>
-            <a:off x="838200" y="111967"/>
-            <a:ext cx="10515600" cy="1175657"/>
+            <a:off x="1191490" y="678872"/>
+            <a:ext cx="10162309" cy="1052946"/>
           </a:xfrm>
         </p:spPr>
         <p:txBody>
@@ -6938,7 +6954,7 @@
           <a:p>
             <a:r>
               <a:rPr lang="en-US" b="1" dirty="0"/>
-              <a:t>  PROJECT SCOPE STATEMENT</a:t>
+              <a:t>PROJECT SCOPE STATEMENT</a:t>
             </a:r>
             <a:endParaRPr lang="en-ID" dirty="0"/>
           </a:p>
@@ -6962,13 +6978,13 @@
         </p:nvSpPr>
         <p:spPr>
           <a:xfrm>
-            <a:off x="1097280" y="1483567"/>
-            <a:ext cx="10058400" cy="4385527"/>
+            <a:off x="734291" y="1731818"/>
+            <a:ext cx="10619509" cy="4572000"/>
           </a:xfrm>
         </p:spPr>
         <p:txBody>
           <a:bodyPr>
-            <a:normAutofit fontScale="92500" lnSpcReduction="10000"/>
+            <a:normAutofit/>
           </a:bodyPr>
           <a:lstStyle/>
           <a:p>
@@ -7587,7 +7603,7 @@
             <a:endParaRPr lang="en-ID" b="1" dirty="0"/>
           </a:p>
           <a:p>
-            <a:pPr lvl="1"/>
+            <a:pPr lvl="3"/>
             <a:r>
               <a:rPr lang="en-US" dirty="0"/>
               <a:t>Login admin dan login user</a:t>
@@ -7595,7 +7611,7 @@
             <a:endParaRPr lang="en-ID" dirty="0"/>
           </a:p>
           <a:p>
-            <a:pPr lvl="1"/>
+            <a:pPr lvl="3"/>
             <a:r>
               <a:rPr lang="en-US" dirty="0"/>
               <a:t>Daftar user</a:t>
@@ -7603,7 +7619,7 @@
             <a:endParaRPr lang="en-ID" dirty="0"/>
           </a:p>
           <a:p>
-            <a:pPr lvl="1"/>
+            <a:pPr lvl="3"/>
             <a:r>
               <a:rPr lang="en-US" dirty="0" err="1"/>
               <a:t>Katalog</a:t>
@@ -7615,7 +7631,7 @@
             <a:endParaRPr lang="en-ID" dirty="0"/>
           </a:p>
           <a:p>
-            <a:pPr lvl="1"/>
+            <a:pPr lvl="3"/>
             <a:r>
               <a:rPr lang="en-US" dirty="0" err="1"/>
               <a:t>Kategori</a:t>
@@ -7627,7 +7643,7 @@
             <a:endParaRPr lang="en-ID" dirty="0"/>
           </a:p>
           <a:p>
-            <a:pPr lvl="1"/>
+            <a:pPr lvl="3"/>
             <a:r>
               <a:rPr lang="en-US" dirty="0" err="1"/>
               <a:t>Membuat</a:t>
@@ -7639,7 +7655,7 @@
             <a:endParaRPr lang="en-ID" dirty="0"/>
           </a:p>
           <a:p>
-            <a:pPr lvl="1"/>
+            <a:pPr lvl="3"/>
             <a:r>
               <a:rPr lang="en-US" dirty="0" err="1"/>
               <a:t>Menambah</a:t>
@@ -7651,7 +7667,7 @@
             <a:endParaRPr lang="en-ID" dirty="0"/>
           </a:p>
           <a:p>
-            <a:pPr lvl="1"/>
+            <a:pPr lvl="3"/>
             <a:r>
               <a:rPr lang="en-US" dirty="0" err="1"/>
               <a:t>Mengganti</a:t>
@@ -7663,7 +7679,7 @@
             <a:endParaRPr lang="en-ID" dirty="0"/>
           </a:p>
           <a:p>
-            <a:pPr lvl="1"/>
+            <a:pPr lvl="3"/>
             <a:r>
               <a:rPr lang="en-US" dirty="0" err="1"/>
               <a:t>Mengexport</a:t>
@@ -7724,8 +7740,8 @@
         </p:nvSpPr>
         <p:spPr>
           <a:xfrm>
-            <a:off x="1097280" y="65315"/>
-            <a:ext cx="10058400" cy="1119673"/>
+            <a:off x="1246570" y="942109"/>
+            <a:ext cx="9909110" cy="831273"/>
           </a:xfrm>
         </p:spPr>
         <p:txBody>
@@ -7734,7 +7750,27 @@
           <a:p>
             <a:r>
               <a:rPr lang="en-US" dirty="0"/>
-              <a:t>Work Breakdown Structure</a:t>
+              <a:t>W</a:t>
+            </a:r>
+            <a:r>
+              <a:rPr lang="id-ID" dirty="0"/>
+              <a:t>ORK</a:t>
+            </a:r>
+            <a:r>
+              <a:rPr lang="en-US" dirty="0"/>
+              <a:t> B</a:t>
+            </a:r>
+            <a:r>
+              <a:rPr lang="id-ID" dirty="0"/>
+              <a:t>REAKDOWN</a:t>
+            </a:r>
+            <a:r>
+              <a:rPr lang="en-US" dirty="0"/>
+              <a:t> S</a:t>
+            </a:r>
+            <a:r>
+              <a:rPr lang="id-ID" dirty="0"/>
+              <a:t>TRUCTURE</a:t>
             </a:r>
             <a:endParaRPr lang="en-ID" dirty="0"/>
           </a:p>
@@ -7770,8 +7806,8 @@
         </p:blipFill>
         <p:spPr>
           <a:xfrm>
-            <a:off x="1246571" y="1782147"/>
-            <a:ext cx="9909109" cy="4506685"/>
+            <a:off x="1246571" y="1773382"/>
+            <a:ext cx="9909109" cy="4515450"/>
           </a:xfrm>
           <a:solidFill>
             <a:schemeClr val="tx1">
@@ -7850,8 +7886,8 @@
         </p:nvSpPr>
         <p:spPr>
           <a:xfrm>
-            <a:off x="1097280" y="286603"/>
-            <a:ext cx="10058400" cy="1047675"/>
+            <a:off x="1233054" y="955963"/>
+            <a:ext cx="9922625" cy="803563"/>
           </a:xfrm>
         </p:spPr>
         <p:txBody>
@@ -7860,7 +7896,19 @@
           <a:p>
             <a:r>
               <a:rPr lang="en-US" b="1" dirty="0"/>
-              <a:t>Gantt Chart</a:t>
+              <a:t>G</a:t>
+            </a:r>
+            <a:r>
+              <a:rPr lang="id-ID" b="1" dirty="0"/>
+              <a:t>ANTT</a:t>
+            </a:r>
+            <a:r>
+              <a:rPr lang="en-US" b="1" dirty="0"/>
+              <a:t> C</a:t>
+            </a:r>
+            <a:r>
+              <a:rPr lang="id-ID" b="1" dirty="0"/>
+              <a:t>HART</a:t>
             </a:r>
             <a:endParaRPr lang="en-ID" dirty="0"/>
           </a:p>
@@ -7896,8 +7944,8 @@
         </p:blipFill>
         <p:spPr>
           <a:xfrm>
-            <a:off x="1219199" y="1737359"/>
-            <a:ext cx="9878292" cy="4551473"/>
+            <a:off x="1233055" y="1759527"/>
+            <a:ext cx="9922625" cy="4529305"/>
           </a:xfrm>
         </p:spPr>
       </p:pic>
@@ -7949,8 +7997,8 @@
         </p:nvSpPr>
         <p:spPr>
           <a:xfrm>
-            <a:off x="1097280" y="286604"/>
-            <a:ext cx="10058400" cy="1066336"/>
+            <a:off x="1205344" y="945472"/>
+            <a:ext cx="9950336" cy="827343"/>
           </a:xfrm>
         </p:spPr>
         <p:txBody>
@@ -7958,10 +8006,13 @@
           <a:lstStyle/>
           <a:p>
             <a:r>
-              <a:rPr lang="en-US" dirty="0" err="1"/>
-              <a:t>Penugasan</a:t>
-            </a:r>
-            <a:endParaRPr lang="id-ID" dirty="0"/>
+              <a:rPr lang="en-US" dirty="0"/>
+              <a:t>P</a:t>
+            </a:r>
+            <a:r>
+              <a:rPr lang="id-ID" dirty="0"/>
+              <a:t>ENUGASAN</a:t>
+            </a:r>
           </a:p>
         </p:txBody>
       </p:sp>
@@ -7981,14 +8032,14 @@
             <p:ph idx="1"/>
             <p:extLst>
               <p:ext uri="{D42A27DB-BD31-4B8C-83A1-F6EECF244321}">
-                <p14:modId xmlns:p14="http://schemas.microsoft.com/office/powerpoint/2010/main" val="1421906850"/>
+                <p14:modId xmlns:p14="http://schemas.microsoft.com/office/powerpoint/2010/main" val="4004429812"/>
               </p:ext>
             </p:extLst>
           </p:nvPr>
         </p:nvGraphicFramePr>
         <p:xfrm>
-          <a:off x="1240971" y="1772816"/>
-          <a:ext cx="9914709" cy="4139711"/>
+          <a:off x="1205345" y="1772816"/>
+          <a:ext cx="9950335" cy="4139711"/>
         </p:xfrm>
         <a:graphic>
           <a:graphicData uri="http://schemas.openxmlformats.org/drawingml/2006/table">
@@ -7997,21 +8048,21 @@
                 <a:tableStyleId>{5C22544A-7EE6-4342-B048-85BDC9FD1C3A}</a:tableStyleId>
               </a:tblPr>
               <a:tblGrid>
-                <a:gridCol w="1925186">
+                <a:gridCol w="1932104">
                   <a:extLst>
                     <a:ext uri="{9D8B030D-6E8A-4147-A177-3AD203B41FA5}">
                       <a16:colId xmlns:a16="http://schemas.microsoft.com/office/drawing/2014/main" val="4004728017"/>
                     </a:ext>
                   </a:extLst>
                 </a:gridCol>
-                <a:gridCol w="3946632">
+                <a:gridCol w="3960813">
                   <a:extLst>
                     <a:ext uri="{9D8B030D-6E8A-4147-A177-3AD203B41FA5}">
                       <a16:colId xmlns:a16="http://schemas.microsoft.com/office/drawing/2014/main" val="2842062422"/>
                     </a:ext>
                   </a:extLst>
                 </a:gridCol>
-                <a:gridCol w="4042891">
+                <a:gridCol w="4057418">
                   <a:extLst>
                     <a:ext uri="{9D8B030D-6E8A-4147-A177-3AD203B41FA5}">
                       <a16:colId xmlns:a16="http://schemas.microsoft.com/office/drawing/2014/main" val="3847026060"/>
@@ -8152,10 +8203,26 @@
                         </a:spcAft>
                       </a:pPr>
                       <a:r>
-                        <a:rPr lang="en-US" sz="1600"/>
-                        <a:t>Maheswara Athallah Wijanarko</a:t>
+                        <a:rPr lang="en-US" sz="1600" dirty="0" err="1"/>
+                        <a:t>Maheswara</a:t>
                       </a:r>
-                      <a:endParaRPr lang="id-ID" sz="1600"/>
+                      <a:r>
+                        <a:rPr lang="en-US" sz="1600" dirty="0"/>
+                        <a:t> </a:t>
+                      </a:r>
+                      <a:r>
+                        <a:rPr lang="en-US" sz="1600" dirty="0" err="1"/>
+                        <a:t>Athallah</a:t>
+                      </a:r>
+                      <a:r>
+                        <a:rPr lang="en-US" sz="1600" dirty="0"/>
+                        <a:t> </a:t>
+                      </a:r>
+                      <a:r>
+                        <a:rPr lang="en-US" sz="1600" dirty="0" err="1"/>
+                        <a:t>Wijanarko</a:t>
+                      </a:r>
+                      <a:endParaRPr lang="id-ID" sz="1600" dirty="0"/>
                     </a:p>
                   </a:txBody>
                   <a:tcPr marL="68580" marR="68580" marT="0" marB="0"/>
@@ -8775,8 +8842,8 @@
         </p:nvSpPr>
         <p:spPr>
           <a:xfrm>
-            <a:off x="1097280" y="286603"/>
-            <a:ext cx="10058400" cy="870393"/>
+            <a:off x="1212696" y="900545"/>
+            <a:ext cx="9942984" cy="847407"/>
           </a:xfrm>
         </p:spPr>
         <p:txBody>
@@ -8785,19 +8852,7 @@
           <a:p>
             <a:r>
               <a:rPr lang="id-ID" dirty="0"/>
-              <a:t>Project </a:t>
-            </a:r>
-            <a:r>
-              <a:rPr lang="id-ID" dirty="0" err="1"/>
-              <a:t>Management</a:t>
-            </a:r>
-            <a:r>
-              <a:rPr lang="id-ID" dirty="0"/>
-              <a:t> </a:t>
-            </a:r>
-            <a:r>
-              <a:rPr lang="id-ID" dirty="0" err="1"/>
-              <a:t>Tools</a:t>
+              <a:t>PROJECT MANAGEMENT TOOLS</a:t>
             </a:r>
             <a:r>
               <a:rPr lang="en-US" dirty="0"/>
@@ -8829,8 +8884,8 @@
         </p:nvSpPr>
         <p:spPr>
           <a:xfrm>
-            <a:off x="1184988" y="1221479"/>
-            <a:ext cx="10168812" cy="635313"/>
+            <a:off x="1212697" y="1747952"/>
+            <a:ext cx="9942983" cy="635313"/>
           </a:xfrm>
         </p:spPr>
         <p:txBody>
@@ -9162,8 +9217,8 @@
         </p:blipFill>
         <p:spPr>
           <a:xfrm>
-            <a:off x="1097281" y="2043405"/>
-            <a:ext cx="10183430" cy="4170784"/>
+            <a:off x="1212697" y="2285999"/>
+            <a:ext cx="9942983" cy="3928189"/>
           </a:xfrm>
           <a:prstGeom prst="rect">
             <a:avLst/>
@@ -9218,8 +9273,8 @@
         </p:nvSpPr>
         <p:spPr>
           <a:xfrm>
-            <a:off x="1097280" y="286604"/>
-            <a:ext cx="10058400" cy="823740"/>
+            <a:off x="1219200" y="886691"/>
+            <a:ext cx="9936479" cy="864227"/>
           </a:xfrm>
         </p:spPr>
         <p:txBody>
@@ -9230,7 +9285,15 @@
           <a:p>
             <a:r>
               <a:rPr lang="en-US" dirty="0"/>
-              <a:t>Diagram : Draw.io</a:t>
+              <a:t>D</a:t>
+            </a:r>
+            <a:r>
+              <a:rPr lang="id-ID" dirty="0"/>
+              <a:t>IAGRAM</a:t>
+            </a:r>
+            <a:r>
+              <a:rPr lang="en-US" dirty="0"/>
+              <a:t> : Draw.io</a:t>
             </a:r>
             <a:endParaRPr lang="id-ID" dirty="0"/>
           </a:p>
@@ -9254,13 +9317,13 @@
         </p:nvSpPr>
         <p:spPr>
           <a:xfrm>
-            <a:off x="1166326" y="1404555"/>
-            <a:ext cx="10187473" cy="823740"/>
+            <a:off x="1127760" y="1750918"/>
+            <a:ext cx="9936479" cy="354972"/>
           </a:xfrm>
         </p:spPr>
         <p:txBody>
           <a:bodyPr>
-            <a:normAutofit/>
+            <a:normAutofit lnSpcReduction="10000"/>
           </a:bodyPr>
           <a:lstStyle/>
           <a:p>
@@ -9505,8 +9568,8 @@
         </p:blipFill>
         <p:spPr>
           <a:xfrm>
-            <a:off x="1166326" y="1892393"/>
-            <a:ext cx="9989354" cy="4309554"/>
+            <a:off x="1219199" y="2105890"/>
+            <a:ext cx="9936479" cy="4197926"/>
           </a:xfrm>
           <a:prstGeom prst="rect">
             <a:avLst/>

</xml_diff>